<commit_message>
Final presentation and license
</commit_message>
<xml_diff>
--- a/Presentation.pptx
+++ b/Presentation.pptx
@@ -307,7 +307,7 @@
           <a:p>
             <a:fld id="{CE308CB4-5BFE-FB42-A6A4-99C26AE6CCAF}" type="datetimeFigureOut">
               <a:rPr lang="en-US" smtClean="0"/>
-              <a:t>5/11/14</a:t>
+              <a:t>5/12/14</a:t>
             </a:fld>
             <a:endParaRPr lang="en-US"/>
           </a:p>
@@ -507,7 +507,7 @@
           <a:p>
             <a:fld id="{CE308CB4-5BFE-FB42-A6A4-99C26AE6CCAF}" type="datetimeFigureOut">
               <a:rPr lang="en-US" smtClean="0"/>
-              <a:t>5/11/14</a:t>
+              <a:t>5/12/14</a:t>
             </a:fld>
             <a:endParaRPr lang="en-US"/>
           </a:p>
@@ -682,7 +682,7 @@
           <a:p>
             <a:fld id="{CE308CB4-5BFE-FB42-A6A4-99C26AE6CCAF}" type="datetimeFigureOut">
               <a:rPr lang="en-US" smtClean="0"/>
-              <a:t>5/11/14</a:t>
+              <a:t>5/12/14</a:t>
             </a:fld>
             <a:endParaRPr lang="en-US"/>
           </a:p>
@@ -847,7 +847,7 @@
           <a:p>
             <a:fld id="{CE308CB4-5BFE-FB42-A6A4-99C26AE6CCAF}" type="datetimeFigureOut">
               <a:rPr lang="en-US" smtClean="0"/>
-              <a:t>5/11/14</a:t>
+              <a:t>5/12/14</a:t>
             </a:fld>
             <a:endParaRPr lang="en-US"/>
           </a:p>
@@ -1095,7 +1095,7 @@
           <a:p>
             <a:fld id="{CE308CB4-5BFE-FB42-A6A4-99C26AE6CCAF}" type="datetimeFigureOut">
               <a:rPr lang="en-US" smtClean="0"/>
-              <a:t>5/11/14</a:t>
+              <a:t>5/12/14</a:t>
             </a:fld>
             <a:endParaRPr lang="en-US"/>
           </a:p>
@@ -1413,7 +1413,7 @@
           <a:p>
             <a:fld id="{CE308CB4-5BFE-FB42-A6A4-99C26AE6CCAF}" type="datetimeFigureOut">
               <a:rPr lang="en-US" smtClean="0"/>
-              <a:t>5/11/14</a:t>
+              <a:t>5/12/14</a:t>
             </a:fld>
             <a:endParaRPr lang="en-US"/>
           </a:p>
@@ -1879,7 +1879,7 @@
           <a:p>
             <a:fld id="{CE308CB4-5BFE-FB42-A6A4-99C26AE6CCAF}" type="datetimeFigureOut">
               <a:rPr lang="en-US" smtClean="0"/>
-              <a:t>5/11/14</a:t>
+              <a:t>5/12/14</a:t>
             </a:fld>
             <a:endParaRPr lang="en-US"/>
           </a:p>
@@ -2027,7 +2027,7 @@
           <a:p>
             <a:fld id="{CE308CB4-5BFE-FB42-A6A4-99C26AE6CCAF}" type="datetimeFigureOut">
               <a:rPr lang="en-US" smtClean="0"/>
-              <a:t>5/11/14</a:t>
+              <a:t>5/12/14</a:t>
             </a:fld>
             <a:endParaRPr lang="en-US"/>
           </a:p>
@@ -2117,7 +2117,7 @@
           <a:p>
             <a:fld id="{CE308CB4-5BFE-FB42-A6A4-99C26AE6CCAF}" type="datetimeFigureOut">
               <a:rPr lang="en-US" smtClean="0"/>
-              <a:t>5/11/14</a:t>
+              <a:t>5/12/14</a:t>
             </a:fld>
             <a:endParaRPr lang="en-US"/>
           </a:p>
@@ -2391,7 +2391,7 @@
           <a:p>
             <a:fld id="{CE308CB4-5BFE-FB42-A6A4-99C26AE6CCAF}" type="datetimeFigureOut">
               <a:rPr lang="en-US" smtClean="0"/>
-              <a:t>5/11/14</a:t>
+              <a:t>5/12/14</a:t>
             </a:fld>
             <a:endParaRPr lang="en-US"/>
           </a:p>
@@ -2696,7 +2696,7 @@
           <a:p>
             <a:fld id="{CE308CB4-5BFE-FB42-A6A4-99C26AE6CCAF}" type="datetimeFigureOut">
               <a:rPr lang="en-US" smtClean="0"/>
-              <a:t>5/11/14</a:t>
+              <a:t>5/12/14</a:t>
             </a:fld>
             <a:endParaRPr lang="en-US"/>
           </a:p>
@@ -3000,7 +3000,7 @@
             <a:fld id="{CE308CB4-5BFE-FB42-A6A4-99C26AE6CCAF}" type="datetimeFigureOut">
               <a:rPr lang="en-US" smtClean="0"/>
               <a:pPr/>
-              <a:t>5/11/14</a:t>
+              <a:t>5/12/14</a:t>
             </a:fld>
             <a:endParaRPr lang="en-US" dirty="0"/>
           </a:p>
@@ -3418,7 +3418,7 @@
             <a:pPr algn="ctr"/>
             <a:r>
               <a:rPr lang="en-US" dirty="0" smtClean="0"/>
-              <a:t>Singing Synthesizer</a:t>
+              <a:t>VOCAL MUSIC SYNTHESIS</a:t>
             </a:r>
             <a:endParaRPr lang="en-US" dirty="0"/>
           </a:p>
@@ -3642,11 +3642,7 @@
           <a:p>
             <a:r>
               <a:rPr lang="en-US" sz="2800" dirty="0" smtClean="0"/>
-              <a:t>Playability is very </a:t>
-            </a:r>
-            <a:r>
-              <a:rPr lang="en-US" sz="2800" dirty="0" smtClean="0"/>
-              <a:t>high</a:t>
+              <a:t>Playability is very high</a:t>
             </a:r>
           </a:p>
           <a:p>
@@ -3689,11 +3685,7 @@
           <a:p>
             <a:r>
               <a:rPr lang="en-US" sz="2800" dirty="0" smtClean="0"/>
-              <a:t>Some consonants are </a:t>
-            </a:r>
-            <a:r>
-              <a:rPr lang="en-US" sz="2800" dirty="0" smtClean="0"/>
-              <a:t>great, while others are hard to distinguish</a:t>
+              <a:t>Some consonants are great, while others are hard to distinguish</a:t>
             </a:r>
           </a:p>
         </p:txBody>
@@ -4028,15 +4020,7 @@
             </a:pPr>
             <a:r>
               <a:rPr lang="en-US" sz="2000" dirty="0" smtClean="0"/>
-              <a:t>Supports H, F, V, S, Z, T, D, P, B, K, G, </a:t>
-            </a:r>
-            <a:r>
-              <a:rPr lang="en-US" sz="2000" dirty="0" smtClean="0"/>
-              <a:t>L, M</a:t>
-            </a:r>
-            <a:r>
-              <a:rPr lang="en-US" sz="2000" dirty="0" smtClean="0"/>
-              <a:t>, N</a:t>
+              <a:t>Supports H, F, V, S, Z, T, D, P, B, K, G, L, M, N</a:t>
             </a:r>
           </a:p>
           <a:p>
@@ -4649,10 +4633,6 @@
                 </a:rPr>
                 <a:t>F</a:t>
               </a:r>
-              <a:endParaRPr lang="en-US" dirty="0">
-                <a:latin typeface="Avenir Black"/>
-                <a:cs typeface="Avenir Black"/>
-              </a:endParaRPr>
             </a:p>
           </p:txBody>
         </p:sp>
@@ -4859,10 +4839,6 @@
                 </a:rPr>
                 <a:t>K</a:t>
               </a:r>
-              <a:endParaRPr lang="en-US" dirty="0">
-                <a:latin typeface="Avenir Black"/>
-                <a:cs typeface="Avenir Black"/>
-              </a:endParaRPr>
             </a:p>
           </p:txBody>
         </p:sp>
@@ -4896,10 +4872,6 @@
                 </a:rPr>
                 <a:t>B</a:t>
               </a:r>
-              <a:endParaRPr lang="en-US" dirty="0">
-                <a:latin typeface="Avenir Black"/>
-                <a:cs typeface="Avenir Black"/>
-              </a:endParaRPr>
             </a:p>
           </p:txBody>
         </p:sp>
@@ -4933,10 +4905,6 @@
                 </a:rPr>
                 <a:t>P</a:t>
               </a:r>
-              <a:endParaRPr lang="en-US" dirty="0">
-                <a:latin typeface="Avenir Black"/>
-                <a:cs typeface="Avenir Black"/>
-              </a:endParaRPr>
             </a:p>
           </p:txBody>
         </p:sp>
@@ -5003,10 +4971,6 @@
                 </a:rPr>
                 <a:t>Z</a:t>
               </a:r>
-              <a:endParaRPr lang="en-US" dirty="0">
-                <a:latin typeface="Avenir Black"/>
-                <a:cs typeface="Avenir Black"/>
-              </a:endParaRPr>
             </a:p>
           </p:txBody>
         </p:sp>

</xml_diff>